<commit_message>
Alterações desenhos e troca no ppt
</commit_message>
<xml_diff>
--- a/Documentação/Sprint3/ppt_sprint3.pptx
+++ b/Documentação/Sprint3/ppt_sprint3.pptx
@@ -246,7 +246,7 @@
           <a:p>
             <a:fld id="{909402F0-89B5-4B44-A4D9-2D9E94F77198}" type="datetimeFigureOut">
               <a:rPr lang="pt-BR" smtClean="0"/>
-              <a:t>27/06/2020</a:t>
+              <a:t>30/06/2020</a:t>
             </a:fld>
             <a:endParaRPr lang="pt-BR"/>
           </a:p>
@@ -416,7 +416,7 @@
           <a:p>
             <a:fld id="{909402F0-89B5-4B44-A4D9-2D9E94F77198}" type="datetimeFigureOut">
               <a:rPr lang="pt-BR" smtClean="0"/>
-              <a:t>27/06/2020</a:t>
+              <a:t>30/06/2020</a:t>
             </a:fld>
             <a:endParaRPr lang="pt-BR"/>
           </a:p>
@@ -596,7 +596,7 @@
           <a:p>
             <a:fld id="{909402F0-89B5-4B44-A4D9-2D9E94F77198}" type="datetimeFigureOut">
               <a:rPr lang="pt-BR" smtClean="0"/>
-              <a:t>27/06/2020</a:t>
+              <a:t>30/06/2020</a:t>
             </a:fld>
             <a:endParaRPr lang="pt-BR"/>
           </a:p>
@@ -766,7 +766,7 @@
           <a:p>
             <a:fld id="{909402F0-89B5-4B44-A4D9-2D9E94F77198}" type="datetimeFigureOut">
               <a:rPr lang="pt-BR" smtClean="0"/>
-              <a:t>27/06/2020</a:t>
+              <a:t>30/06/2020</a:t>
             </a:fld>
             <a:endParaRPr lang="pt-BR"/>
           </a:p>
@@ -1012,7 +1012,7 @@
           <a:p>
             <a:fld id="{909402F0-89B5-4B44-A4D9-2D9E94F77198}" type="datetimeFigureOut">
               <a:rPr lang="pt-BR" smtClean="0"/>
-              <a:t>27/06/2020</a:t>
+              <a:t>30/06/2020</a:t>
             </a:fld>
             <a:endParaRPr lang="pt-BR"/>
           </a:p>
@@ -1244,7 +1244,7 @@
           <a:p>
             <a:fld id="{909402F0-89B5-4B44-A4D9-2D9E94F77198}" type="datetimeFigureOut">
               <a:rPr lang="pt-BR" smtClean="0"/>
-              <a:t>27/06/2020</a:t>
+              <a:t>30/06/2020</a:t>
             </a:fld>
             <a:endParaRPr lang="pt-BR"/>
           </a:p>
@@ -1611,7 +1611,7 @@
           <a:p>
             <a:fld id="{909402F0-89B5-4B44-A4D9-2D9E94F77198}" type="datetimeFigureOut">
               <a:rPr lang="pt-BR" smtClean="0"/>
-              <a:t>27/06/2020</a:t>
+              <a:t>30/06/2020</a:t>
             </a:fld>
             <a:endParaRPr lang="pt-BR"/>
           </a:p>
@@ -1729,7 +1729,7 @@
           <a:p>
             <a:fld id="{909402F0-89B5-4B44-A4D9-2D9E94F77198}" type="datetimeFigureOut">
               <a:rPr lang="pt-BR" smtClean="0"/>
-              <a:t>27/06/2020</a:t>
+              <a:t>30/06/2020</a:t>
             </a:fld>
             <a:endParaRPr lang="pt-BR"/>
           </a:p>
@@ -1824,7 +1824,7 @@
           <a:p>
             <a:fld id="{909402F0-89B5-4B44-A4D9-2D9E94F77198}" type="datetimeFigureOut">
               <a:rPr lang="pt-BR" smtClean="0"/>
-              <a:t>27/06/2020</a:t>
+              <a:t>30/06/2020</a:t>
             </a:fld>
             <a:endParaRPr lang="pt-BR"/>
           </a:p>
@@ -2101,7 +2101,7 @@
           <a:p>
             <a:fld id="{909402F0-89B5-4B44-A4D9-2D9E94F77198}" type="datetimeFigureOut">
               <a:rPr lang="pt-BR" smtClean="0"/>
-              <a:t>27/06/2020</a:t>
+              <a:t>30/06/2020</a:t>
             </a:fld>
             <a:endParaRPr lang="pt-BR"/>
           </a:p>
@@ -2354,7 +2354,7 @@
           <a:p>
             <a:fld id="{909402F0-89B5-4B44-A4D9-2D9E94F77198}" type="datetimeFigureOut">
               <a:rPr lang="pt-BR" smtClean="0"/>
-              <a:t>27/06/2020</a:t>
+              <a:t>30/06/2020</a:t>
             </a:fld>
             <a:endParaRPr lang="pt-BR"/>
           </a:p>
@@ -2567,7 +2567,7 @@
           <a:p>
             <a:fld id="{909402F0-89B5-4B44-A4D9-2D9E94F77198}" type="datetimeFigureOut">
               <a:rPr lang="pt-BR" smtClean="0"/>
-              <a:t>27/06/2020</a:t>
+              <a:t>30/06/2020</a:t>
             </a:fld>
             <a:endParaRPr lang="pt-BR"/>
           </a:p>
@@ -3565,7 +3565,7 @@
       </p:sp>
       <p:pic>
         <p:nvPicPr>
-          <p:cNvPr id="7" name="Imagem 6"/>
+          <p:cNvPr id="8" name="Imagem 7"/>
           <p:cNvPicPr>
             <a:picLocks noChangeAspect="1"/>
           </p:cNvPicPr>
@@ -3585,8 +3585,8 @@
         </p:blipFill>
         <p:spPr>
           <a:xfrm>
-            <a:off x="679269" y="707886"/>
-            <a:ext cx="10842171" cy="5657850"/>
+            <a:off x="679268" y="707886"/>
+            <a:ext cx="10835697" cy="5657850"/>
           </a:xfrm>
           <a:prstGeom prst="rect">
             <a:avLst/>
@@ -3726,7 +3726,7 @@
       </p:sp>
       <p:pic>
         <p:nvPicPr>
-          <p:cNvPr id="8" name="Imagem 7"/>
+          <p:cNvPr id="3" name="Imagem 2"/>
           <p:cNvPicPr>
             <a:picLocks noChangeAspect="1"/>
           </p:cNvPicPr>
@@ -3746,8 +3746,8 @@
         </p:blipFill>
         <p:spPr>
           <a:xfrm>
-            <a:off x="692251" y="600075"/>
-            <a:ext cx="10842251" cy="5657850"/>
+            <a:off x="692249" y="600075"/>
+            <a:ext cx="10807771" cy="5657850"/>
           </a:xfrm>
           <a:prstGeom prst="rect">
             <a:avLst/>
@@ -3887,7 +3887,7 @@
       </p:sp>
       <p:pic>
         <p:nvPicPr>
-          <p:cNvPr id="7" name="Imagem 6"/>
+          <p:cNvPr id="3" name="Imagem 2"/>
           <p:cNvPicPr>
             <a:picLocks noChangeAspect="1"/>
           </p:cNvPicPr>
@@ -3907,8 +3907,8 @@
         </p:blipFill>
         <p:spPr>
           <a:xfrm>
-            <a:off x="666207" y="600075"/>
-            <a:ext cx="10868296" cy="5657850"/>
+            <a:off x="679731" y="600075"/>
+            <a:ext cx="10835234" cy="5657850"/>
           </a:xfrm>
           <a:prstGeom prst="rect">
             <a:avLst/>
@@ -4134,7 +4134,7 @@
     </a:clrScheme>
     <a:fontScheme name="Office">
       <a:majorFont>
-        <a:latin typeface="Calibri Light" panose="020F0302020204030204"/>
+        <a:latin typeface="Calibri Light"/>
         <a:ea typeface=""/>
         <a:cs typeface=""/>
         <a:font script="Jpan" typeface="游ゴシック Light"/>
@@ -4169,7 +4169,7 @@
         <a:font script="Geor" typeface="Sylfaen"/>
       </a:majorFont>
       <a:minorFont>
-        <a:latin typeface="Calibri" panose="020F0502020204030204"/>
+        <a:latin typeface="Calibri"/>
         <a:ea typeface=""/>
         <a:cs typeface=""/>
         <a:font script="Jpan" typeface="游ゴシック"/>
@@ -4346,7 +4346,7 @@
   <a:extraClrSchemeLst/>
   <a:extLst>
     <a:ext uri="{05A4C25C-085E-4340-85A3-A5531E510DB2}">
-      <thm15:themeFamily xmlns:thm15="http://schemas.microsoft.com/office/thememl/2012/main" name="Office Theme" id="{62F939B6-93AF-4DB8-9C6B-D6C7DFDC589F}" vid="{4A3C46E8-61CC-4603-A589-7422A47A8E4A}"/>
+      <thm15:themeFamily xmlns:thm15="http://schemas.microsoft.com/office/thememl/2012/main" xmlns="" name="Office Theme" id="{62F939B6-93AF-4DB8-9C6B-D6C7DFDC589F}" vid="{4A3C46E8-61CC-4603-A589-7422A47A8E4A}"/>
     </a:ext>
   </a:extLst>
 </a:theme>

</xml_diff>

<commit_message>
nova alteração imagens no ppt
</commit_message>
<xml_diff>
--- a/Documentação/Sprint3/ppt_sprint3.pptx
+++ b/Documentação/Sprint3/ppt_sprint3.pptx
@@ -116,7 +116,7 @@
   </p:defaultTextStyle>
   <p:extLst>
     <p:ext uri="{EFAFB233-063F-42B5-8137-9DF3F51BA10A}">
-      <p15:sldGuideLst xmlns:p15="http://schemas.microsoft.com/office/powerpoint/2012/main"/>
+      <p15:sldGuideLst xmlns:p15="http://schemas.microsoft.com/office/powerpoint/2012/main" xmlns=""/>
     </p:ext>
   </p:extLst>
 </p:presentation>
@@ -3519,9 +3519,55 @@
           </a:xfrm>
         </p:spPr>
       </p:pic>
+      <p:sp>
+        <p:nvSpPr>
+          <p:cNvPr id="6" name="CaixaDeTexto 5"/>
+          <p:cNvSpPr txBox="1"/>
+          <p:nvPr/>
+        </p:nvSpPr>
+        <p:spPr>
+          <a:xfrm>
+            <a:off x="3913742" y="-52252"/>
+            <a:ext cx="5574719" cy="707886"/>
+          </a:xfrm>
+          <a:prstGeom prst="rect">
+            <a:avLst/>
+          </a:prstGeom>
+          <a:noFill/>
+        </p:spPr>
+        <p:txBody>
+          <a:bodyPr wrap="square" rtlCol="0">
+            <a:spAutoFit/>
+          </a:bodyPr>
+          <a:lstStyle/>
+          <a:p>
+            <a:r>
+              <a:rPr lang="pt-BR" sz="4000" b="1" dirty="0" smtClean="0">
+                <a:solidFill>
+                  <a:schemeClr val="bg1">
+                    <a:lumMod val="75000"/>
+                  </a:schemeClr>
+                </a:solidFill>
+                <a:latin typeface="Impact" panose="020B0806030902050204" pitchFamily="34" charset="0"/>
+                <a:cs typeface="Leelawadee UI Semilight" panose="020B0402040204020203" pitchFamily="34" charset="-34"/>
+              </a:rPr>
+              <a:t>Desenho de solução</a:t>
+            </a:r>
+            <a:endParaRPr lang="pt-BR" sz="4000" b="1" dirty="0">
+              <a:solidFill>
+                <a:schemeClr val="bg1">
+                  <a:lumMod val="75000"/>
+                </a:schemeClr>
+              </a:solidFill>
+              <a:latin typeface="Impact" panose="020B0806030902050204" pitchFamily="34" charset="0"/>
+              <a:cs typeface="Leelawadee UI Semilight" panose="020B0402040204020203" pitchFamily="34" charset="-34"/>
+            </a:endParaRPr>
+          </a:p>
+        </p:txBody>
+      </p:sp>
       <p:pic>
         <p:nvPicPr>
-          <p:cNvPr id="5" name="Imagem 4"/>
+          <p:cNvPr id="7" name="Imagem 6"/>
           <p:cNvPicPr>
             <a:picLocks noChangeAspect="1"/>
           </p:cNvPicPr>
@@ -3541,63 +3587,17 @@
         </p:blipFill>
         <p:spPr>
           <a:xfrm>
-            <a:off x="690880" y="655634"/>
-            <a:ext cx="10830560" cy="5760720"/>
+            <a:off x="10534650" y="-38849"/>
+            <a:ext cx="902970" cy="785584"/>
           </a:xfrm>
           <a:prstGeom prst="rect">
             <a:avLst/>
           </a:prstGeom>
         </p:spPr>
       </p:pic>
-      <p:sp>
-        <p:nvSpPr>
-          <p:cNvPr id="6" name="CaixaDeTexto 5"/>
-          <p:cNvSpPr txBox="1"/>
-          <p:nvPr/>
-        </p:nvSpPr>
-        <p:spPr>
-          <a:xfrm>
-            <a:off x="3913742" y="-52252"/>
-            <a:ext cx="5574719" cy="707886"/>
-          </a:xfrm>
-          <a:prstGeom prst="rect">
-            <a:avLst/>
-          </a:prstGeom>
-          <a:noFill/>
-        </p:spPr>
-        <p:txBody>
-          <a:bodyPr wrap="square" rtlCol="0">
-            <a:spAutoFit/>
-          </a:bodyPr>
-          <a:lstStyle/>
-          <a:p>
-            <a:r>
-              <a:rPr lang="pt-BR" sz="4000" b="1" dirty="0" smtClean="0">
-                <a:solidFill>
-                  <a:schemeClr val="bg1">
-                    <a:lumMod val="75000"/>
-                  </a:schemeClr>
-                </a:solidFill>
-                <a:latin typeface="Impact" panose="020B0806030902050204" pitchFamily="34" charset="0"/>
-                <a:cs typeface="Leelawadee UI Semilight" panose="020B0402040204020203" pitchFamily="34" charset="-34"/>
-              </a:rPr>
-              <a:t>Desenho de solução</a:t>
-            </a:r>
-            <a:endParaRPr lang="pt-BR" sz="4000" b="1" dirty="0">
-              <a:solidFill>
-                <a:schemeClr val="bg1">
-                  <a:lumMod val="75000"/>
-                </a:schemeClr>
-              </a:solidFill>
-              <a:latin typeface="Impact" panose="020B0806030902050204" pitchFamily="34" charset="0"/>
-              <a:cs typeface="Leelawadee UI Semilight" panose="020B0402040204020203" pitchFamily="34" charset="-34"/>
-            </a:endParaRPr>
-          </a:p>
-        </p:txBody>
-      </p:sp>
       <p:pic>
         <p:nvPicPr>
-          <p:cNvPr id="7" name="Imagem 6"/>
+          <p:cNvPr id="3" name="Imagem 2"/>
           <p:cNvPicPr>
             <a:picLocks noChangeAspect="1"/>
           </p:cNvPicPr>
@@ -3617,8 +3617,8 @@
         </p:blipFill>
         <p:spPr>
           <a:xfrm>
-            <a:off x="10534650" y="-38849"/>
-            <a:ext cx="902970" cy="785584"/>
+            <a:off x="690880" y="746734"/>
+            <a:ext cx="10815994" cy="5669619"/>
           </a:xfrm>
           <a:prstGeom prst="rect">
             <a:avLst/>
@@ -3758,7 +3758,7 @@
       </p:sp>
       <p:pic>
         <p:nvPicPr>
-          <p:cNvPr id="7" name="Imagem 6"/>
+          <p:cNvPr id="8" name="Imagem 7"/>
           <p:cNvPicPr>
             <a:picLocks noChangeAspect="1"/>
           </p:cNvPicPr>
@@ -3778,8 +3778,8 @@
         </p:blipFill>
         <p:spPr>
           <a:xfrm>
-            <a:off x="679269" y="707886"/>
-            <a:ext cx="10842171" cy="5657850"/>
+            <a:off x="10534650" y="-38849"/>
+            <a:ext cx="902970" cy="785584"/>
           </a:xfrm>
           <a:prstGeom prst="rect">
             <a:avLst/>
@@ -3788,7 +3788,7 @@
       </p:pic>
       <p:pic>
         <p:nvPicPr>
-          <p:cNvPr id="8" name="Imagem 7"/>
+          <p:cNvPr id="3" name="Imagem 2"/>
           <p:cNvPicPr>
             <a:picLocks noChangeAspect="1"/>
           </p:cNvPicPr>
@@ -3808,8 +3808,8 @@
         </p:blipFill>
         <p:spPr>
           <a:xfrm>
-            <a:off x="10534650" y="-38849"/>
-            <a:ext cx="902970" cy="785584"/>
+            <a:off x="679268" y="707886"/>
+            <a:ext cx="10835697" cy="5657850"/>
           </a:xfrm>
           <a:prstGeom prst="rect">
             <a:avLst/>
@@ -3949,7 +3949,7 @@
       </p:sp>
       <p:pic>
         <p:nvPicPr>
-          <p:cNvPr id="8" name="Imagem 7"/>
+          <p:cNvPr id="7" name="Imagem 6"/>
           <p:cNvPicPr>
             <a:picLocks noChangeAspect="1"/>
           </p:cNvPicPr>
@@ -3969,8 +3969,8 @@
         </p:blipFill>
         <p:spPr>
           <a:xfrm>
-            <a:off x="692251" y="600075"/>
-            <a:ext cx="10842251" cy="5657850"/>
+            <a:off x="10631532" y="-120830"/>
+            <a:ext cx="902970" cy="785584"/>
           </a:xfrm>
           <a:prstGeom prst="rect">
             <a:avLst/>
@@ -3979,7 +3979,7 @@
       </p:pic>
       <p:pic>
         <p:nvPicPr>
-          <p:cNvPr id="7" name="Imagem 6"/>
+          <p:cNvPr id="3" name="Imagem 2"/>
           <p:cNvPicPr>
             <a:picLocks noChangeAspect="1"/>
           </p:cNvPicPr>
@@ -3999,8 +3999,8 @@
         </p:blipFill>
         <p:spPr>
           <a:xfrm>
-            <a:off x="10631532" y="-120830"/>
-            <a:ext cx="902970" cy="785584"/>
+            <a:off x="692251" y="600075"/>
+            <a:ext cx="10842251" cy="5657850"/>
           </a:xfrm>
           <a:prstGeom prst="rect">
             <a:avLst/>
@@ -4140,7 +4140,7 @@
       </p:sp>
       <p:pic>
         <p:nvPicPr>
-          <p:cNvPr id="7" name="Imagem 6"/>
+          <p:cNvPr id="3" name="Imagem 2"/>
           <p:cNvPicPr>
             <a:picLocks noChangeAspect="1"/>
           </p:cNvPicPr>
@@ -4160,8 +4160,8 @@
         </p:blipFill>
         <p:spPr>
           <a:xfrm>
-            <a:off x="666207" y="600075"/>
-            <a:ext cx="10868296" cy="5657850"/>
+            <a:off x="666206" y="600075"/>
+            <a:ext cx="10848759" cy="5657850"/>
           </a:xfrm>
           <a:prstGeom prst="rect">
             <a:avLst/>
@@ -4486,7 +4486,7 @@
     </a:clrScheme>
     <a:fontScheme name="Office">
       <a:majorFont>
-        <a:latin typeface="Calibri Light" panose="020F0302020204030204"/>
+        <a:latin typeface="Calibri Light"/>
         <a:ea typeface=""/>
         <a:cs typeface=""/>
         <a:font script="Jpan" typeface="游ゴシック Light"/>
@@ -4521,7 +4521,7 @@
         <a:font script="Geor" typeface="Sylfaen"/>
       </a:majorFont>
       <a:minorFont>
-        <a:latin typeface="Calibri" panose="020F0502020204030204"/>
+        <a:latin typeface="Calibri"/>
         <a:ea typeface=""/>
         <a:cs typeface=""/>
         <a:font script="Jpan" typeface="游ゴシック"/>
@@ -4698,7 +4698,7 @@
   <a:extraClrSchemeLst/>
   <a:extLst>
     <a:ext uri="{05A4C25C-085E-4340-85A3-A5531E510DB2}">
-      <thm15:themeFamily xmlns:thm15="http://schemas.microsoft.com/office/thememl/2012/main" name="Office Theme" id="{62F939B6-93AF-4DB8-9C6B-D6C7DFDC589F}" vid="{4A3C46E8-61CC-4603-A589-7422A47A8E4A}"/>
+      <thm15:themeFamily xmlns:thm15="http://schemas.microsoft.com/office/thememl/2012/main" xmlns="" name="Office Theme" id="{62F939B6-93AF-4DB8-9C6B-D6C7DFDC589F}" vid="{4A3C46E8-61CC-4603-A589-7422A47A8E4A}"/>
     </a:ext>
   </a:extLst>
 </a:theme>

</xml_diff>